<commit_message>
Add test script for App 807
- also a script for checking various tables in NIvaatabase + Labware
</commit_message>
<xml_diff>
--- a/Info/CEMP database structures.pptx
+++ b/Info/CEMP database structures.pptx
@@ -254,7 +254,7 @@
           <a:p>
             <a:fld id="{77F09603-E645-4CC3-81A1-03E50081548E}" type="datetimeFigureOut">
               <a:rPr lang="nb-NO" smtClean="0"/>
-              <a:t>26.08.2021</a:t>
+              <a:t>27.12.2021</a:t>
             </a:fld>
             <a:endParaRPr lang="nb-NO"/>
           </a:p>
@@ -424,7 +424,7 @@
           <a:p>
             <a:fld id="{77F09603-E645-4CC3-81A1-03E50081548E}" type="datetimeFigureOut">
               <a:rPr lang="nb-NO" smtClean="0"/>
-              <a:t>26.08.2021</a:t>
+              <a:t>27.12.2021</a:t>
             </a:fld>
             <a:endParaRPr lang="nb-NO"/>
           </a:p>
@@ -604,7 +604,7 @@
           <a:p>
             <a:fld id="{77F09603-E645-4CC3-81A1-03E50081548E}" type="datetimeFigureOut">
               <a:rPr lang="nb-NO" smtClean="0"/>
-              <a:t>26.08.2021</a:t>
+              <a:t>27.12.2021</a:t>
             </a:fld>
             <a:endParaRPr lang="nb-NO"/>
           </a:p>
@@ -774,7 +774,7 @@
           <a:p>
             <a:fld id="{77F09603-E645-4CC3-81A1-03E50081548E}" type="datetimeFigureOut">
               <a:rPr lang="nb-NO" smtClean="0"/>
-              <a:t>26.08.2021</a:t>
+              <a:t>27.12.2021</a:t>
             </a:fld>
             <a:endParaRPr lang="nb-NO"/>
           </a:p>
@@ -1020,7 +1020,7 @@
           <a:p>
             <a:fld id="{77F09603-E645-4CC3-81A1-03E50081548E}" type="datetimeFigureOut">
               <a:rPr lang="nb-NO" smtClean="0"/>
-              <a:t>26.08.2021</a:t>
+              <a:t>27.12.2021</a:t>
             </a:fld>
             <a:endParaRPr lang="nb-NO"/>
           </a:p>
@@ -1252,7 +1252,7 @@
           <a:p>
             <a:fld id="{77F09603-E645-4CC3-81A1-03E50081548E}" type="datetimeFigureOut">
               <a:rPr lang="nb-NO" smtClean="0"/>
-              <a:t>26.08.2021</a:t>
+              <a:t>27.12.2021</a:t>
             </a:fld>
             <a:endParaRPr lang="nb-NO"/>
           </a:p>
@@ -1619,7 +1619,7 @@
           <a:p>
             <a:fld id="{77F09603-E645-4CC3-81A1-03E50081548E}" type="datetimeFigureOut">
               <a:rPr lang="nb-NO" smtClean="0"/>
-              <a:t>26.08.2021</a:t>
+              <a:t>27.12.2021</a:t>
             </a:fld>
             <a:endParaRPr lang="nb-NO"/>
           </a:p>
@@ -1737,7 +1737,7 @@
           <a:p>
             <a:fld id="{77F09603-E645-4CC3-81A1-03E50081548E}" type="datetimeFigureOut">
               <a:rPr lang="nb-NO" smtClean="0"/>
-              <a:t>26.08.2021</a:t>
+              <a:t>27.12.2021</a:t>
             </a:fld>
             <a:endParaRPr lang="nb-NO"/>
           </a:p>
@@ -1832,7 +1832,7 @@
           <a:p>
             <a:fld id="{77F09603-E645-4CC3-81A1-03E50081548E}" type="datetimeFigureOut">
               <a:rPr lang="nb-NO" smtClean="0"/>
-              <a:t>26.08.2021</a:t>
+              <a:t>27.12.2021</a:t>
             </a:fld>
             <a:endParaRPr lang="nb-NO"/>
           </a:p>
@@ -2109,7 +2109,7 @@
           <a:p>
             <a:fld id="{77F09603-E645-4CC3-81A1-03E50081548E}" type="datetimeFigureOut">
               <a:rPr lang="nb-NO" smtClean="0"/>
-              <a:t>26.08.2021</a:t>
+              <a:t>27.12.2021</a:t>
             </a:fld>
             <a:endParaRPr lang="nb-NO"/>
           </a:p>
@@ -2362,7 +2362,7 @@
           <a:p>
             <a:fld id="{77F09603-E645-4CC3-81A1-03E50081548E}" type="datetimeFigureOut">
               <a:rPr lang="nb-NO" smtClean="0"/>
-              <a:t>26.08.2021</a:t>
+              <a:t>27.12.2021</a:t>
             </a:fld>
             <a:endParaRPr lang="nb-NO"/>
           </a:p>
@@ -2575,7 +2575,7 @@
           <a:p>
             <a:fld id="{77F09603-E645-4CC3-81A1-03E50081548E}" type="datetimeFigureOut">
               <a:rPr lang="nb-NO" smtClean="0"/>
-              <a:t>26.08.2021</a:t>
+              <a:t>27.12.2021</a:t>
             </a:fld>
             <a:endParaRPr lang="nb-NO"/>
           </a:p>
@@ -3318,7 +3318,7 @@
         </p:nvSpPr>
         <p:spPr>
           <a:xfrm>
-            <a:off x="3475995" y="121147"/>
+            <a:off x="4362299" y="101664"/>
             <a:ext cx="2824964" cy="954107"/>
           </a:xfrm>
           <a:prstGeom prst="rect">
@@ -3741,9 +3741,9 @@
           <p:nvPr/>
         </p:nvSpPr>
         <p:spPr>
-          <a:xfrm rot="18111389" flipV="1">
-            <a:off x="3670799" y="1431702"/>
-            <a:ext cx="1068952" cy="381305"/>
+          <a:xfrm rot="18674790" flipV="1">
+            <a:off x="3991978" y="1421152"/>
+            <a:ext cx="1184378" cy="381305"/>
           </a:xfrm>
           <a:prstGeom prst="rightArrow">
             <a:avLst/>
@@ -3782,7 +3782,7 @@
         </p:nvSpPr>
         <p:spPr>
           <a:xfrm rot="2823653" flipV="1">
-            <a:off x="4931184" y="1191256"/>
+            <a:off x="5575505" y="1198115"/>
             <a:ext cx="503419" cy="381305"/>
           </a:xfrm>
           <a:prstGeom prst="rightArrow">
@@ -4995,6 +4995,105 @@
           <a:p>
             <a:pPr algn="ctr"/>
             <a:endParaRPr lang="nb-NO"/>
+          </a:p>
+        </p:txBody>
+      </p:sp>
+      <p:sp>
+        <p:nvSpPr>
+          <p:cNvPr id="47" name="TextBox 46">
+            <a:extLst>
+              <a:ext uri="{FF2B5EF4-FFF2-40B4-BE49-F238E27FC236}">
+                <a16:creationId xmlns:a16="http://schemas.microsoft.com/office/drawing/2014/main" id="{272ED544-D850-42A1-BD5E-A1AF0FE7C414}"/>
+              </a:ext>
+            </a:extLst>
+          </p:cNvPr>
+          <p:cNvSpPr txBox="1"/>
+          <p:nvPr/>
+        </p:nvSpPr>
+        <p:spPr>
+          <a:xfrm>
+            <a:off x="3154370" y="61397"/>
+            <a:ext cx="972432" cy="600164"/>
+          </a:xfrm>
+          <a:prstGeom prst="rect">
+            <a:avLst/>
+          </a:prstGeom>
+          <a:noFill/>
+          <a:ln w="19050">
+            <a:solidFill>
+              <a:schemeClr val="tx1"/>
+            </a:solidFill>
+          </a:ln>
+        </p:spPr>
+        <p:txBody>
+          <a:bodyPr wrap="square" rtlCol="0">
+            <a:spAutoFit/>
+          </a:bodyPr>
+          <a:lstStyle/>
+          <a:p>
+            <a:r>
+              <a:rPr lang="nb-NO" sz="1100" b="1" noProof="1"/>
+              <a:t>O_NUMBER</a:t>
+            </a:r>
+            <a:br>
+              <a:rPr lang="nb-NO" sz="1100" b="1" noProof="1"/>
+            </a:br>
+            <a:r>
+              <a:rPr lang="nb-NO" sz="1100" u="sng" noProof="1"/>
+              <a:t>PROJECT_ID</a:t>
+            </a:r>
+          </a:p>
+          <a:p>
+            <a:r>
+              <a:rPr lang="nb-NO" sz="1100" noProof="1"/>
+              <a:t>O_NUMBER</a:t>
+            </a:r>
+          </a:p>
+        </p:txBody>
+      </p:sp>
+      <p:sp>
+        <p:nvSpPr>
+          <p:cNvPr id="48" name="Arrow: Right 47">
+            <a:extLst>
+              <a:ext uri="{FF2B5EF4-FFF2-40B4-BE49-F238E27FC236}">
+                <a16:creationId xmlns:a16="http://schemas.microsoft.com/office/drawing/2014/main" id="{089613E0-1FB7-4521-A9C0-17DBB009CAA0}"/>
+              </a:ext>
+            </a:extLst>
+          </p:cNvPr>
+          <p:cNvSpPr/>
+          <p:nvPr/>
+        </p:nvSpPr>
+        <p:spPr>
+          <a:xfrm rot="19598012" flipV="1">
+            <a:off x="2698610" y="297825"/>
+            <a:ext cx="454761" cy="139924"/>
+          </a:xfrm>
+          <a:prstGeom prst="rightArrow">
+            <a:avLst/>
+          </a:prstGeom>
+        </p:spPr>
+        <p:style>
+          <a:lnRef idx="2">
+            <a:schemeClr val="accent1">
+              <a:shade val="50000"/>
+            </a:schemeClr>
+          </a:lnRef>
+          <a:fillRef idx="1">
+            <a:schemeClr val="accent1"/>
+          </a:fillRef>
+          <a:effectRef idx="0">
+            <a:schemeClr val="accent1"/>
+          </a:effectRef>
+          <a:fontRef idx="minor">
+            <a:schemeClr val="lt1"/>
+          </a:fontRef>
+        </p:style>
+        <p:txBody>
+          <a:bodyPr rtlCol="0" anchor="ctr"/>
+          <a:lstStyle/>
+          <a:p>
+            <a:pPr algn="ctr"/>
+            <a:endParaRPr lang="nb-NO" dirty="0"/>
           </a:p>
         </p:txBody>
       </p:sp>
@@ -10629,6 +10728,113 @@
               <a:rPr lang="nb-NO" sz="1000" dirty="0"/>
               <a:t> for SPECIMEN_ID, SAMPLE_ID etc.)</a:t>
             </a:r>
+          </a:p>
+        </p:txBody>
+      </p:sp>
+      <p:sp>
+        <p:nvSpPr>
+          <p:cNvPr id="18" name="TextBox 17">
+            <a:extLst>
+              <a:ext uri="{FF2B5EF4-FFF2-40B4-BE49-F238E27FC236}">
+                <a16:creationId xmlns:a16="http://schemas.microsoft.com/office/drawing/2014/main" id="{9A8ED2E7-1F2E-4581-8F90-55DE6F263C42}"/>
+              </a:ext>
+            </a:extLst>
+          </p:cNvPr>
+          <p:cNvSpPr txBox="1"/>
+          <p:nvPr/>
+        </p:nvSpPr>
+        <p:spPr>
+          <a:xfrm>
+            <a:off x="367552" y="3168935"/>
+            <a:ext cx="1653989" cy="1200329"/>
+          </a:xfrm>
+          <a:prstGeom prst="rect">
+            <a:avLst/>
+          </a:prstGeom>
+          <a:solidFill>
+            <a:schemeClr val="bg1"/>
+          </a:solidFill>
+          <a:ln w="19050">
+            <a:solidFill>
+              <a:schemeClr val="tx1"/>
+            </a:solidFill>
+          </a:ln>
+        </p:spPr>
+        <p:txBody>
+          <a:bodyPr wrap="square" rtlCol="0">
+            <a:spAutoFit/>
+          </a:bodyPr>
+          <a:lstStyle/>
+          <a:p>
+            <a:r>
+              <a:rPr lang="nb-NO" b="1" noProof="1"/>
+              <a:t>dbo_locality</a:t>
+            </a:r>
+            <a:br>
+              <a:rPr lang="nb-NO" b="1" noProof="1"/>
+            </a:br>
+            <a:r>
+              <a:rPr lang="nb-NO" u="sng" noProof="1"/>
+              <a:t>jmpst</a:t>
+            </a:r>
+          </a:p>
+          <a:p>
+            <a:r>
+              <a:rPr lang="nb-NO" noProof="1"/>
+              <a:t>stnam</a:t>
+            </a:r>
+          </a:p>
+          <a:p>
+            <a:r>
+              <a:rPr lang="nb-NO" noProof="1"/>
+              <a:t>[coordinates]</a:t>
+            </a:r>
+          </a:p>
+        </p:txBody>
+      </p:sp>
+      <p:sp>
+        <p:nvSpPr>
+          <p:cNvPr id="19" name="Arrow: Right 18">
+            <a:extLst>
+              <a:ext uri="{FF2B5EF4-FFF2-40B4-BE49-F238E27FC236}">
+                <a16:creationId xmlns:a16="http://schemas.microsoft.com/office/drawing/2014/main" id="{1F3F98B7-CEEA-43D8-931A-C5F48518FEC3}"/>
+              </a:ext>
+            </a:extLst>
+          </p:cNvPr>
+          <p:cNvSpPr/>
+          <p:nvPr/>
+        </p:nvSpPr>
+        <p:spPr>
+          <a:xfrm rot="5400000">
+            <a:off x="947165" y="2881488"/>
+            <a:ext cx="344061" cy="376518"/>
+          </a:xfrm>
+          <a:prstGeom prst="rightArrow">
+            <a:avLst/>
+          </a:prstGeom>
+        </p:spPr>
+        <p:style>
+          <a:lnRef idx="2">
+            <a:schemeClr val="accent1">
+              <a:shade val="50000"/>
+            </a:schemeClr>
+          </a:lnRef>
+          <a:fillRef idx="1">
+            <a:schemeClr val="accent1"/>
+          </a:fillRef>
+          <a:effectRef idx="0">
+            <a:schemeClr val="accent1"/>
+          </a:effectRef>
+          <a:fontRef idx="minor">
+            <a:schemeClr val="lt1"/>
+          </a:fontRef>
+        </p:style>
+        <p:txBody>
+          <a:bodyPr rtlCol="0" anchor="ctr"/>
+          <a:lstStyle/>
+          <a:p>
+            <a:pPr algn="ctr"/>
+            <a:endParaRPr lang="nb-NO"/>
           </a:p>
         </p:txBody>
       </p:sp>

</xml_diff>